<commit_message>
add cp12,13,14; edit simple_graphs MST, edit well-ordering of finite sets; edit trees-minimum.pptx
</commit_message>
<xml_diff>
--- a/spring17/slidesS17/trees-minimum.pptx
+++ b/spring17/slidesS17/trees-minimum.pptx
@@ -13155,7 +13155,7 @@
         <p:spPr>
           <a:xfrm>
             <a:off x="83087" y="1008968"/>
-            <a:ext cx="9060913" cy="4937998"/>
+            <a:ext cx="9060913" cy="5394014"/>
           </a:xfrm>
         </p:spPr>
         <p:txBody>
@@ -13168,13 +13168,8 @@
             </a:pPr>
             <a:r>
               <a:rPr lang="en-US" sz="4400" dirty="0" smtClean="0"/>
-              <a:t>start at any vertex, keep building one tree.  </a:t>
-            </a:r>
-            <a:r>
-              <a:rPr lang="en-US" sz="4400" smtClean="0"/>
-              <a:t>(Prim)</a:t>
-            </a:r>
-            <a:endParaRPr lang="en-US" sz="4400" dirty="0" smtClean="0"/>
+              <a:t>start at any vertex, keep building one tree.  (Prim)</a:t>
+            </a:r>
           </a:p>
           <a:p>
             <a:pPr marL="571500" indent="-571500">
@@ -13201,7 +13196,29 @@
             </a:pPr>
             <a:r>
               <a:rPr lang="en-US" sz="4400" dirty="0" smtClean="0"/>
-              <a:t>grow trees in parallel (Meyer)</a:t>
+              <a:t>grow trees in parallel </a:t>
+            </a:r>
+            <a:r>
+              <a:rPr lang="en-US" sz="4400" dirty="0" smtClean="0"/>
+              <a:t>(</a:t>
+            </a:r>
+            <a:r>
+              <a:rPr lang="en-US" sz="4400" dirty="0" err="1" smtClean="0"/>
+              <a:t>Boruvka</a:t>
+            </a:r>
+            <a:r>
+              <a:rPr lang="en-US" sz="4400" dirty="0" smtClean="0"/>
+              <a:t>)</a:t>
+            </a:r>
+          </a:p>
+          <a:p>
+            <a:pPr marL="571500" indent="-571500">
+              <a:buFont typeface="Arial"/>
+              <a:buChar char="•"/>
+            </a:pPr>
+            <a:r>
+              <a:rPr lang="en-US" sz="4400" dirty="0" smtClean="0"/>
+              <a:t>All special cases of gray edges</a:t>
             </a:r>
             <a:endParaRPr lang="en-US" sz="4400" dirty="0"/>
           </a:p>
@@ -13434,6 +13451,67 @@
                                           <p:spTgt spid="3">
                                             <p:txEl>
                                               <p:pRg st="2" end="2"/>
+                                            </p:txEl>
+                                          </p:spTgt>
+                                        </p:tgtEl>
+                                      </p:cBhvr>
+                                    </p:animEffect>
+                                  </p:childTnLst>
+                                </p:cTn>
+                              </p:par>
+                            </p:childTnLst>
+                          </p:cTn>
+                        </p:par>
+                      </p:childTnLst>
+                    </p:cTn>
+                  </p:par>
+                  <p:par>
+                    <p:cTn id="18" fill="hold">
+                      <p:stCondLst>
+                        <p:cond delay="indefinite"/>
+                      </p:stCondLst>
+                      <p:childTnLst>
+                        <p:par>
+                          <p:cTn id="19" fill="hold">
+                            <p:stCondLst>
+                              <p:cond delay="0"/>
+                            </p:stCondLst>
+                            <p:childTnLst>
+                              <p:par>
+                                <p:cTn id="20" presetID="9" presetClass="entr" presetSubtype="0" fill="hold" grpId="0" nodeType="clickEffect">
+                                  <p:stCondLst>
+                                    <p:cond delay="0"/>
+                                  </p:stCondLst>
+                                  <p:childTnLst>
+                                    <p:set>
+                                      <p:cBhvr>
+                                        <p:cTn id="21" dur="1" fill="hold">
+                                          <p:stCondLst>
+                                            <p:cond delay="0"/>
+                                          </p:stCondLst>
+                                        </p:cTn>
+                                        <p:tgtEl>
+                                          <p:spTgt spid="3">
+                                            <p:txEl>
+                                              <p:pRg st="3" end="3"/>
+                                            </p:txEl>
+                                          </p:spTgt>
+                                        </p:tgtEl>
+                                        <p:attrNameLst>
+                                          <p:attrName>style.visibility</p:attrName>
+                                        </p:attrNameLst>
+                                      </p:cBhvr>
+                                      <p:to>
+                                        <p:strVal val="visible"/>
+                                      </p:to>
+                                    </p:set>
+                                    <p:animEffect transition="in" filter="dissolve">
+                                      <p:cBhvr>
+                                        <p:cTn id="22" dur="500"/>
+                                        <p:tgtEl>
+                                          <p:spTgt spid="3">
+                                            <p:txEl>
+                                              <p:pRg st="3" end="3"/>
                                             </p:txEl>
                                           </p:spTgt>
                                         </p:tgtEl>
@@ -14802,8 +14880,13 @@
             </a:pPr>
             <a:r>
               <a:rPr lang="en-US" sz="4400" dirty="0" smtClean="0"/>
-              <a:t>Start with vertices</a:t>
-            </a:r>
+              <a:t>Start with </a:t>
+            </a:r>
+            <a:r>
+              <a:rPr lang="en-US" sz="4400" dirty="0" smtClean="0"/>
+              <a:t>vertices w/o edges</a:t>
+            </a:r>
+            <a:endParaRPr lang="en-US" sz="4400" dirty="0" smtClean="0"/>
           </a:p>
           <a:p>
             <a:pPr marL="571500" indent="-571500">
@@ -14812,8 +14895,23 @@
             </a:pPr>
             <a:r>
               <a:rPr lang="en-US" sz="4400" dirty="0" smtClean="0"/>
-              <a:t>Color components black &amp; white</a:t>
-            </a:r>
+              <a:t>Color components black &amp; </a:t>
+            </a:r>
+            <a:r>
+              <a:rPr lang="en-US" sz="4400" dirty="0" smtClean="0"/>
+              <a:t>white</a:t>
+            </a:r>
+          </a:p>
+          <a:p>
+            <a:pPr marL="571500" indent="-571500">
+              <a:buFont typeface="Arial"/>
+              <a:buChar char="•"/>
+            </a:pPr>
+            <a:r>
+              <a:rPr lang="en-US" sz="4400" dirty="0" smtClean="0"/>
+              <a:t>Graph is connected, so have:</a:t>
+            </a:r>
+            <a:endParaRPr lang="en-US" sz="4400" dirty="0" smtClean="0"/>
           </a:p>
           <a:p>
             <a:pPr marL="571500" indent="-571500">
@@ -14883,7 +14981,7 @@
         </p:nvGrpSpPr>
         <p:grpSpPr>
           <a:xfrm>
-            <a:off x="4543668" y="3349777"/>
+            <a:off x="4543668" y="4187793"/>
             <a:ext cx="1789345" cy="276225"/>
             <a:chOff x="4218637" y="3489841"/>
             <a:chExt cx="1789345" cy="276225"/>
@@ -15204,21 +15302,82 @@
                             </p:childTnLst>
                           </p:cTn>
                         </p:par>
+                      </p:childTnLst>
+                    </p:cTn>
+                  </p:par>
+                  <p:par>
+                    <p:cTn id="18" fill="hold">
+                      <p:stCondLst>
+                        <p:cond delay="indefinite"/>
+                      </p:stCondLst>
+                      <p:childTnLst>
                         <p:par>
-                          <p:cTn id="18" fill="hold">
+                          <p:cTn id="19" fill="hold">
                             <p:stCondLst>
-                              <p:cond delay="500"/>
+                              <p:cond delay="0"/>
                             </p:stCondLst>
                             <p:childTnLst>
                               <p:par>
-                                <p:cTn id="19" presetID="1" presetClass="entr" presetSubtype="0" fill="hold" nodeType="afterEffect">
+                                <p:cTn id="20" presetID="9" presetClass="entr" presetSubtype="0" fill="hold" grpId="0" nodeType="clickEffect">
                                   <p:stCondLst>
                                     <p:cond delay="0"/>
                                   </p:stCondLst>
                                   <p:childTnLst>
                                     <p:set>
                                       <p:cBhvr>
-                                        <p:cTn id="20" dur="1" fill="hold">
+                                        <p:cTn id="21" dur="1" fill="hold">
+                                          <p:stCondLst>
+                                            <p:cond delay="0"/>
+                                          </p:stCondLst>
+                                        </p:cTn>
+                                        <p:tgtEl>
+                                          <p:spTgt spid="3">
+                                            <p:txEl>
+                                              <p:pRg st="3" end="3"/>
+                                            </p:txEl>
+                                          </p:spTgt>
+                                        </p:tgtEl>
+                                        <p:attrNameLst>
+                                          <p:attrName>style.visibility</p:attrName>
+                                        </p:attrNameLst>
+                                      </p:cBhvr>
+                                      <p:to>
+                                        <p:strVal val="visible"/>
+                                      </p:to>
+                                    </p:set>
+                                    <p:animEffect transition="in" filter="dissolve">
+                                      <p:cBhvr>
+                                        <p:cTn id="22" dur="500"/>
+                                        <p:tgtEl>
+                                          <p:spTgt spid="3">
+                                            <p:txEl>
+                                              <p:pRg st="3" end="3"/>
+                                            </p:txEl>
+                                          </p:spTgt>
+                                        </p:tgtEl>
+                                      </p:cBhvr>
+                                    </p:animEffect>
+                                  </p:childTnLst>
+                                </p:cTn>
+                              </p:par>
+                            </p:childTnLst>
+                          </p:cTn>
+                        </p:par>
+                        <p:par>
+                          <p:cTn id="23" fill="hold">
+                            <p:stCondLst>
+                              <p:cond delay="500"/>
+                            </p:stCondLst>
+                            <p:childTnLst>
+                              <p:par>
+                                <p:cTn id="24" presetID="1" presetClass="entr" presetSubtype="0" fill="hold" nodeType="afterEffect">
+                                  <p:stCondLst>
+                                    <p:cond delay="0"/>
+                                  </p:stCondLst>
+                                  <p:childTnLst>
+                                    <p:set>
+                                      <p:cBhvr>
+                                        <p:cTn id="25" dur="1" fill="hold">
                                           <p:stCondLst>
                                             <p:cond delay="0"/>
                                           </p:stCondLst>
@@ -15244,26 +15403,26 @@
                     </p:cTn>
                   </p:par>
                   <p:par>
-                    <p:cTn id="21" fill="hold">
+                    <p:cTn id="26" fill="hold">
                       <p:stCondLst>
                         <p:cond delay="indefinite"/>
                       </p:stCondLst>
                       <p:childTnLst>
                         <p:par>
-                          <p:cTn id="22" fill="hold">
+                          <p:cTn id="27" fill="hold">
                             <p:stCondLst>
                               <p:cond delay="0"/>
                             </p:stCondLst>
                             <p:childTnLst>
                               <p:par>
-                                <p:cTn id="23" presetID="9" presetClass="entr" presetSubtype="0" fill="hold" grpId="0" nodeType="clickEffect">
+                                <p:cTn id="28" presetID="9" presetClass="entr" presetSubtype="0" fill="hold" grpId="0" nodeType="clickEffect">
                                   <p:stCondLst>
                                     <p:cond delay="0"/>
                                   </p:stCondLst>
                                   <p:childTnLst>
                                     <p:set>
                                       <p:cBhvr>
-                                        <p:cTn id="24" dur="1" fill="hold">
+                                        <p:cTn id="29" dur="1" fill="hold">
                                           <p:stCondLst>
                                             <p:cond delay="0"/>
                                           </p:stCondLst>
@@ -15271,7 +15430,7 @@
                                         <p:tgtEl>
                                           <p:spTgt spid="3">
                                             <p:txEl>
-                                              <p:pRg st="3" end="3"/>
+                                              <p:pRg st="4" end="4"/>
                                             </p:txEl>
                                           </p:spTgt>
                                         </p:tgtEl>
@@ -15285,11 +15444,11 @@
                                     </p:set>
                                     <p:animEffect transition="in" filter="dissolve">
                                       <p:cBhvr>
-                                        <p:cTn id="25" dur="500"/>
+                                        <p:cTn id="30" dur="500"/>
                                         <p:tgtEl>
                                           <p:spTgt spid="3">
                                             <p:txEl>
-                                              <p:pRg st="3" end="3"/>
+                                              <p:pRg st="4" end="4"/>
                                             </p:txEl>
                                           </p:spTgt>
                                         </p:tgtEl>

</xml_diff>